<commit_message>
Minor additions and corrections to the presentation
</commit_message>
<xml_diff>
--- a/Documents/Presentation Final Version.pptx
+++ b/Documents/Presentation Final Version.pptx
@@ -5,7 +5,7 @@
     <p:sldMasterId id="2147483659" r:id="rId1"/>
   </p:sldMasterIdLst>
   <p:notesMasterIdLst>
-    <p:notesMasterId r:id="rId12"/>
+    <p:notesMasterId r:id="rId11"/>
   </p:notesMasterIdLst>
   <p:sldIdLst>
     <p:sldId id="256" r:id="rId2"/>
@@ -13,28 +13,27 @@
     <p:sldId id="258" r:id="rId4"/>
     <p:sldId id="259" r:id="rId5"/>
     <p:sldId id="260" r:id="rId6"/>
-    <p:sldId id="261" r:id="rId7"/>
-    <p:sldId id="262" r:id="rId8"/>
-    <p:sldId id="265" r:id="rId9"/>
-    <p:sldId id="263" r:id="rId10"/>
-    <p:sldId id="264" r:id="rId11"/>
+    <p:sldId id="262" r:id="rId7"/>
+    <p:sldId id="265" r:id="rId8"/>
+    <p:sldId id="263" r:id="rId9"/>
+    <p:sldId id="264" r:id="rId10"/>
   </p:sldIdLst>
   <p:sldSz cx="9144000" cy="5143500" type="screen16x9"/>
   <p:notesSz cx="6858000" cy="9144000"/>
   <p:embeddedFontLst>
     <p:embeddedFont>
       <p:font typeface="Raleway" charset="0"/>
-      <p:regular r:id="rId13"/>
-      <p:bold r:id="rId14"/>
-      <p:italic r:id="rId15"/>
-      <p:boldItalic r:id="rId16"/>
+      <p:regular r:id="rId12"/>
+      <p:bold r:id="rId13"/>
+      <p:italic r:id="rId14"/>
+      <p:boldItalic r:id="rId15"/>
     </p:embeddedFont>
     <p:embeddedFont>
       <p:font typeface="Lato" charset="0"/>
-      <p:regular r:id="rId17"/>
-      <p:bold r:id="rId18"/>
-      <p:italic r:id="rId19"/>
-      <p:boldItalic r:id="rId20"/>
+      <p:regular r:id="rId16"/>
+      <p:bold r:id="rId17"/>
+      <p:italic r:id="rId18"/>
+      <p:boldItalic r:id="rId19"/>
     </p:embeddedFont>
   </p:embeddedFontLst>
   <p:defaultTextStyle>
@@ -268,7 +267,7 @@
   </p:defaultTextStyle>
   <p:extLst>
     <p:ext uri="{EFAFB233-063F-42B5-8137-9DF3F51BA10A}">
-      <p15:sldGuideLst xmlns:p15="http://schemas.microsoft.com/office/powerpoint/2012/main" xmlns:p14="http://schemas.microsoft.com/office/powerpoint/2010/main" xmlns:com="http://schemas.openxmlformats.org/drawingml/2006/compatibility" xmlns:pvml="urn:schemas-microsoft-com:office:powerpoint" xmlns:v="urn:schemas-microsoft-com:vml" xmlns:o="urn:schemas-microsoft-com:office:office" xmlns:dgm="http://schemas.openxmlformats.org/drawingml/2006/diagram" xmlns:c="http://schemas.openxmlformats.org/drawingml/2006/chart" xmlns:mv="urn:schemas-microsoft-com:mac:vml" xmlns:mc="http://schemas.openxmlformats.org/markup-compatibility/2006" xmlns="">
+      <p15:sldGuideLst xmlns="" xmlns:mc="http://schemas.openxmlformats.org/markup-compatibility/2006" xmlns:mv="urn:schemas-microsoft-com:mac:vml" xmlns:c="http://schemas.openxmlformats.org/drawingml/2006/chart" xmlns:dgm="http://schemas.openxmlformats.org/drawingml/2006/diagram" xmlns:o="urn:schemas-microsoft-com:office:office" xmlns:v="urn:schemas-microsoft-com:vml" xmlns:pvml="urn:schemas-microsoft-com:office:powerpoint" xmlns:com="http://schemas.openxmlformats.org/drawingml/2006/compatibility" xmlns:p14="http://schemas.microsoft.com/office/powerpoint/2010/main" xmlns:p15="http://schemas.microsoft.com/office/powerpoint/2012/main">
         <p15:guide id="1" orient="horz" pos="1620">
           <p15:clr>
             <a:srgbClr val="A4A3A4"/>
@@ -963,7 +962,7 @@
         </p:nvSpPr>
         <p:spPr>
           <a:xfrm>
-            <a:off x="381300" y="685800"/>
+            <a:off x="381000" y="685800"/>
             <a:ext cx="6096000" cy="3429000"/>
           </a:xfrm>
           <a:custGeom>
@@ -1251,110 +1250,6 @@
   <p:cSld>
     <p:spTree>
       <p:nvGrpSpPr>
-        <p:cNvPr id="1" name="Shape 112"/>
-        <p:cNvGrpSpPr/>
-        <p:nvPr/>
-      </p:nvGrpSpPr>
-      <p:grpSpPr>
-        <a:xfrm>
-          <a:off x="0" y="0"/>
-          <a:ext cx="0" cy="0"/>
-          <a:chOff x="0" y="0"/>
-          <a:chExt cx="0" cy="0"/>
-        </a:xfrm>
-      </p:grpSpPr>
-      <p:sp>
-        <p:nvSpPr>
-          <p:cNvPr id="113" name="Google Shape;113;g8000227139_0_5:notes"/>
-          <p:cNvSpPr>
-            <a:spLocks noGrp="1" noRot="1" noChangeAspect="1"/>
-          </p:cNvSpPr>
-          <p:nvPr>
-            <p:ph type="sldImg" idx="2"/>
-          </p:nvPr>
-        </p:nvSpPr>
-        <p:spPr>
-          <a:xfrm>
-            <a:off x="381300" y="685800"/>
-            <a:ext cx="6096000" cy="3429000"/>
-          </a:xfrm>
-          <a:custGeom>
-            <a:avLst/>
-            <a:gdLst/>
-            <a:ahLst/>
-            <a:cxnLst/>
-            <a:rect l="l" t="t" r="r" b="b"/>
-            <a:pathLst>
-              <a:path w="120000" h="120000" extrusionOk="0">
-                <a:moveTo>
-                  <a:pt x="0" y="0"/>
-                </a:moveTo>
-                <a:lnTo>
-                  <a:pt x="120000" y="0"/>
-                </a:lnTo>
-                <a:lnTo>
-                  <a:pt x="120000" y="120000"/>
-                </a:lnTo>
-                <a:lnTo>
-                  <a:pt x="0" y="120000"/>
-                </a:lnTo>
-                <a:close/>
-              </a:path>
-            </a:pathLst>
-          </a:custGeom>
-        </p:spPr>
-      </p:sp>
-      <p:sp>
-        <p:nvSpPr>
-          <p:cNvPr id="114" name="Google Shape;114;g8000227139_0_5:notes"/>
-          <p:cNvSpPr txBox="1">
-            <a:spLocks noGrp="1"/>
-          </p:cNvSpPr>
-          <p:nvPr>
-            <p:ph type="body" idx="1"/>
-          </p:nvPr>
-        </p:nvSpPr>
-        <p:spPr>
-          <a:xfrm>
-            <a:off x="685800" y="4343400"/>
-            <a:ext cx="5486400" cy="4114800"/>
-          </a:xfrm>
-          <a:prstGeom prst="rect">
-            <a:avLst/>
-          </a:prstGeom>
-        </p:spPr>
-        <p:txBody>
-          <a:bodyPr spcFirstLastPara="1" wrap="square" lIns="91425" tIns="91425" rIns="91425" bIns="91425" anchor="t" anchorCtr="0">
-            <a:noAutofit/>
-          </a:bodyPr>
-          <a:lstStyle/>
-          <a:p>
-            <a:pPr marL="0" lvl="0" indent="0" algn="l" rtl="0">
-              <a:spcBef>
-                <a:spcPts val="0"/>
-              </a:spcBef>
-              <a:spcAft>
-                <a:spcPts val="0"/>
-              </a:spcAft>
-              <a:buNone/>
-            </a:pPr>
-            <a:endParaRPr/>
-          </a:p>
-        </p:txBody>
-      </p:sp>
-    </p:spTree>
-  </p:cSld>
-  <p:clrMapOvr>
-    <a:masterClrMapping/>
-  </p:clrMapOvr>
-</p:notes>
-</file>
-
-<file path=ppt/notesSlides/notesSlide7.xml><?xml version="1.0" encoding="utf-8"?>
-<p:notes xmlns:a="http://schemas.openxmlformats.org/drawingml/2006/main" xmlns:r="http://schemas.openxmlformats.org/officeDocument/2006/relationships" xmlns:p="http://schemas.openxmlformats.org/presentationml/2006/main" showMasterSp="0" showMasterPhAnim="0">
-  <p:cSld>
-    <p:spTree>
-      <p:nvGrpSpPr>
         <p:cNvPr id="1" name="Shape 118"/>
         <p:cNvGrpSpPr/>
         <p:nvPr/>
@@ -1454,7 +1349,7 @@
 </p:notes>
 </file>
 
-<file path=ppt/notesSlides/notesSlide8.xml><?xml version="1.0" encoding="utf-8"?>
+<file path=ppt/notesSlides/notesSlide7.xml><?xml version="1.0" encoding="utf-8"?>
 <p:notes xmlns:a="http://schemas.openxmlformats.org/drawingml/2006/main" xmlns:r="http://schemas.openxmlformats.org/officeDocument/2006/relationships" xmlns:p="http://schemas.openxmlformats.org/presentationml/2006/main" showMasterSp="0" showMasterPhAnim="0">
   <p:cSld>
     <p:spTree>
@@ -1558,7 +1453,7 @@
 </p:notes>
 </file>
 
-<file path=ppt/notesSlides/notesSlide9.xml><?xml version="1.0" encoding="utf-8"?>
+<file path=ppt/notesSlides/notesSlide8.xml><?xml version="1.0" encoding="utf-8"?>
 <p:notes xmlns:a="http://schemas.openxmlformats.org/drawingml/2006/main" xmlns:r="http://schemas.openxmlformats.org/officeDocument/2006/relationships" xmlns:p="http://schemas.openxmlformats.org/presentationml/2006/main" showMasterSp="0" showMasterPhAnim="0">
   <p:cSld>
     <p:spTree>
@@ -8541,168 +8436,6 @@
 </p:sld>
 </file>
 
-<file path=ppt/slides/slide10.xml><?xml version="1.0" encoding="utf-8"?>
-<p:sld xmlns:a="http://schemas.openxmlformats.org/drawingml/2006/main" xmlns:r="http://schemas.openxmlformats.org/officeDocument/2006/relationships" xmlns:p="http://schemas.openxmlformats.org/presentationml/2006/main">
-  <p:cSld>
-    <p:spTree>
-      <p:nvGrpSpPr>
-        <p:cNvPr id="1" name="Shape 133"/>
-        <p:cNvGrpSpPr/>
-        <p:nvPr/>
-      </p:nvGrpSpPr>
-      <p:grpSpPr>
-        <a:xfrm>
-          <a:off x="0" y="0"/>
-          <a:ext cx="0" cy="0"/>
-          <a:chOff x="0" y="0"/>
-          <a:chExt cx="0" cy="0"/>
-        </a:xfrm>
-      </p:grpSpPr>
-      <p:sp>
-        <p:nvSpPr>
-          <p:cNvPr id="134" name="Google Shape;134;p21"/>
-          <p:cNvSpPr txBox="1">
-            <a:spLocks noGrp="1"/>
-          </p:cNvSpPr>
-          <p:nvPr>
-            <p:ph type="title"/>
-          </p:nvPr>
-        </p:nvSpPr>
-        <p:spPr>
-          <a:xfrm>
-            <a:off x="729450" y="1318650"/>
-            <a:ext cx="7688700" cy="535200"/>
-          </a:xfrm>
-          <a:prstGeom prst="rect">
-            <a:avLst/>
-          </a:prstGeom>
-        </p:spPr>
-        <p:txBody>
-          <a:bodyPr spcFirstLastPara="1" wrap="square" lIns="91425" tIns="91425" rIns="91425" bIns="91425" anchor="t" anchorCtr="0">
-            <a:noAutofit/>
-          </a:bodyPr>
-          <a:lstStyle/>
-          <a:p>
-            <a:pPr marL="0" lvl="0" indent="0" algn="l" rtl="0">
-              <a:spcBef>
-                <a:spcPts val="0"/>
-              </a:spcBef>
-              <a:spcAft>
-                <a:spcPts val="0"/>
-              </a:spcAft>
-              <a:buNone/>
-            </a:pPr>
-            <a:r>
-              <a:rPr lang="en"/>
-              <a:t>Conclusion</a:t>
-            </a:r>
-            <a:endParaRPr/>
-          </a:p>
-        </p:txBody>
-      </p:sp>
-      <p:sp>
-        <p:nvSpPr>
-          <p:cNvPr id="135" name="Google Shape;135;p21"/>
-          <p:cNvSpPr txBox="1">
-            <a:spLocks noGrp="1"/>
-          </p:cNvSpPr>
-          <p:nvPr>
-            <p:ph type="body" idx="1"/>
-          </p:nvPr>
-        </p:nvSpPr>
-        <p:spPr>
-          <a:xfrm>
-            <a:off x="729450" y="2078875"/>
-            <a:ext cx="7688700" cy="2261100"/>
-          </a:xfrm>
-          <a:prstGeom prst="rect">
-            <a:avLst/>
-          </a:prstGeom>
-        </p:spPr>
-        <p:txBody>
-          <a:bodyPr spcFirstLastPara="1" wrap="square" lIns="91425" tIns="91425" rIns="91425" bIns="91425" anchor="t" anchorCtr="0">
-            <a:noAutofit/>
-          </a:bodyPr>
-          <a:lstStyle/>
-          <a:p>
-            <a:pPr marL="457200" lvl="0" indent="-311150" algn="l" rtl="0">
-              <a:spcBef>
-                <a:spcPts val="0"/>
-              </a:spcBef>
-              <a:spcAft>
-                <a:spcPts val="0"/>
-              </a:spcAft>
-              <a:buSzPts val="1300"/>
-              <a:buChar char="●"/>
-            </a:pPr>
-            <a:r>
-              <a:rPr lang="en-GB" dirty="0" smtClean="0"/>
-              <a:t>Most of intended functionality for algorithm achieved.</a:t>
-            </a:r>
-          </a:p>
-          <a:p>
-            <a:pPr marL="457200" lvl="0" indent="-311150" algn="l" rtl="0">
-              <a:spcBef>
-                <a:spcPts val="0"/>
-              </a:spcBef>
-              <a:spcAft>
-                <a:spcPts val="0"/>
-              </a:spcAft>
-              <a:buSzPts val="1300"/>
-              <a:buChar char="●"/>
-            </a:pPr>
-            <a:r>
-              <a:rPr lang="en-GB" dirty="0" smtClean="0"/>
-              <a:t>Algorithm can create viable paths but usually at a much slower rate then the base A* though the paths created by the A* algorithm are not guaranteed to be viable.</a:t>
-            </a:r>
-          </a:p>
-          <a:p>
-            <a:pPr marL="457200" lvl="0" indent="-311150" algn="l" rtl="0">
-              <a:spcBef>
-                <a:spcPts val="0"/>
-              </a:spcBef>
-              <a:spcAft>
-                <a:spcPts val="0"/>
-              </a:spcAft>
-              <a:buSzPts val="1300"/>
-              <a:buChar char="●"/>
-            </a:pPr>
-            <a:r>
-              <a:rPr lang="en-GB" dirty="0" smtClean="0"/>
-              <a:t>Dynamic </a:t>
-            </a:r>
-            <a:r>
-              <a:rPr lang="en-GB" dirty="0" smtClean="0"/>
-              <a:t>elements were integrated.</a:t>
-            </a:r>
-          </a:p>
-          <a:p>
-            <a:pPr marL="457200" lvl="0" indent="-311150" algn="l" rtl="0">
-              <a:spcBef>
-                <a:spcPts val="0"/>
-              </a:spcBef>
-              <a:spcAft>
-                <a:spcPts val="0"/>
-              </a:spcAft>
-              <a:buSzPts val="1300"/>
-              <a:buChar char="●"/>
-            </a:pPr>
-            <a:r>
-              <a:rPr lang="en-GB" dirty="0" smtClean="0"/>
-              <a:t>There are still multiple ways in which the efficiency of the algorithm could be increased such as determining if a path is viable earlier.</a:t>
-            </a:r>
-            <a:endParaRPr/>
-          </a:p>
-        </p:txBody>
-      </p:sp>
-    </p:spTree>
-  </p:cSld>
-  <p:clrMapOvr>
-    <a:masterClrMapping/>
-  </p:clrMapOvr>
-</p:sld>
-</file>
-
 <file path=ppt/slides/slide2.xml><?xml version="1.0" encoding="utf-8"?>
 <p:sld xmlns:a="http://schemas.openxmlformats.org/drawingml/2006/main" xmlns:r="http://schemas.openxmlformats.org/officeDocument/2006/relationships" xmlns:p="http://schemas.openxmlformats.org/presentationml/2006/main">
   <p:cSld>
@@ -8924,7 +8657,7 @@
               <a:buNone/>
             </a:pPr>
             <a:r>
-              <a:rPr lang="en"/>
+              <a:rPr lang="en" dirty="0"/>
               <a:t>My Goals for the project were:</a:t>
             </a:r>
             <a:endParaRPr/>
@@ -8941,7 +8674,7 @@
               <a:buChar char="●"/>
             </a:pPr>
             <a:r>
-              <a:rPr lang="en"/>
+              <a:rPr lang="en" dirty="0"/>
               <a:t>To create a Algorithm that takes into account things like fuel, width etc.</a:t>
             </a:r>
             <a:endParaRPr/>
@@ -8958,8 +8691,12 @@
               <a:buChar char="●"/>
             </a:pPr>
             <a:r>
-              <a:rPr lang="en"/>
-              <a:t>Have it include dynamic elements from algorithms such as D*.</a:t>
+              <a:rPr lang="en" dirty="0"/>
+              <a:t>Have it include dynamic elements from algorithms such as </a:t>
+            </a:r>
+            <a:r>
+              <a:rPr lang="en" dirty="0" smtClean="0"/>
+              <a:t>LPA*.</a:t>
             </a:r>
             <a:endParaRPr/>
           </a:p>
@@ -8975,8 +8712,20 @@
               <a:buChar char="●"/>
             </a:pPr>
             <a:r>
+              <a:rPr lang="en" dirty="0"/>
+              <a:t>Have it include elements from </a:t>
+            </a:r>
+            <a:r>
               <a:rPr lang="en"/>
-              <a:t>Have it include elements from the HRA* algorithm such as creating a rough path and then refining it to fit into the map.</a:t>
+              <a:t>the </a:t>
+            </a:r>
+            <a:r>
+              <a:rPr lang="en" smtClean="0"/>
+              <a:t>HPA</a:t>
+            </a:r>
+            <a:r>
+              <a:rPr lang="en" dirty="0"/>
+              <a:t>* algorithm such as creating a rough path and then refining it to fit into the map.</a:t>
             </a:r>
             <a:endParaRPr/>
           </a:p>
@@ -8992,7 +8741,7 @@
               <a:buChar char="●"/>
             </a:pPr>
             <a:r>
-              <a:rPr lang="en"/>
+              <a:rPr lang="en" dirty="0"/>
               <a:t>To have the algorithm compared to the base A* algorithm.</a:t>
             </a:r>
             <a:endParaRPr/>
@@ -9332,167 +9081,6 @@
   <p:cSld>
     <p:spTree>
       <p:nvGrpSpPr>
-        <p:cNvPr id="1" name="Shape 115"/>
-        <p:cNvGrpSpPr/>
-        <p:nvPr/>
-      </p:nvGrpSpPr>
-      <p:grpSpPr>
-        <a:xfrm>
-          <a:off x="0" y="0"/>
-          <a:ext cx="0" cy="0"/>
-          <a:chOff x="0" y="0"/>
-          <a:chExt cx="0" cy="0"/>
-        </a:xfrm>
-      </p:grpSpPr>
-      <p:sp>
-        <p:nvSpPr>
-          <p:cNvPr id="116" name="Google Shape;116;p18"/>
-          <p:cNvSpPr txBox="1">
-            <a:spLocks noGrp="1"/>
-          </p:cNvSpPr>
-          <p:nvPr>
-            <p:ph type="title"/>
-          </p:nvPr>
-        </p:nvSpPr>
-        <p:spPr>
-          <a:xfrm>
-            <a:off x="729450" y="1318650"/>
-            <a:ext cx="7688700" cy="535200"/>
-          </a:xfrm>
-          <a:prstGeom prst="rect">
-            <a:avLst/>
-          </a:prstGeom>
-        </p:spPr>
-        <p:txBody>
-          <a:bodyPr spcFirstLastPara="1" wrap="square" lIns="91425" tIns="91425" rIns="91425" bIns="91425" anchor="t" anchorCtr="0">
-            <a:noAutofit/>
-          </a:bodyPr>
-          <a:lstStyle/>
-          <a:p>
-            <a:pPr marL="0" lvl="0" indent="0" algn="l" rtl="0">
-              <a:spcBef>
-                <a:spcPts val="0"/>
-              </a:spcBef>
-              <a:spcAft>
-                <a:spcPts val="0"/>
-              </a:spcAft>
-              <a:buNone/>
-            </a:pPr>
-            <a:r>
-              <a:rPr lang="en"/>
-              <a:t>HPA* Algorithm</a:t>
-            </a:r>
-            <a:endParaRPr/>
-          </a:p>
-        </p:txBody>
-      </p:sp>
-      <p:sp>
-        <p:nvSpPr>
-          <p:cNvPr id="117" name="Google Shape;117;p18"/>
-          <p:cNvSpPr txBox="1">
-            <a:spLocks noGrp="1"/>
-          </p:cNvSpPr>
-          <p:nvPr>
-            <p:ph type="body" idx="1"/>
-          </p:nvPr>
-        </p:nvSpPr>
-        <p:spPr>
-          <a:xfrm>
-            <a:off x="729450" y="2078875"/>
-            <a:ext cx="7688700" cy="2261100"/>
-          </a:xfrm>
-          <a:prstGeom prst="rect">
-            <a:avLst/>
-          </a:prstGeom>
-        </p:spPr>
-        <p:txBody>
-          <a:bodyPr spcFirstLastPara="1" wrap="square" lIns="91425" tIns="91425" rIns="91425" bIns="91425" anchor="t" anchorCtr="0">
-            <a:noAutofit/>
-          </a:bodyPr>
-          <a:lstStyle/>
-          <a:p>
-            <a:pPr marL="457200" lvl="0" indent="-311150" algn="l" rtl="0">
-              <a:spcBef>
-                <a:spcPts val="0"/>
-              </a:spcBef>
-              <a:spcAft>
-                <a:spcPts val="0"/>
-              </a:spcAft>
-              <a:buSzPts val="1300"/>
-              <a:buChar char="●"/>
-            </a:pPr>
-            <a:r>
-              <a:rPr lang="en"/>
-              <a:t>This algorithm consists of the following.</a:t>
-            </a:r>
-            <a:endParaRPr/>
-          </a:p>
-          <a:p>
-            <a:pPr marL="457200" lvl="0" indent="-311150" algn="l" rtl="0">
-              <a:spcBef>
-                <a:spcPts val="0"/>
-              </a:spcBef>
-              <a:spcAft>
-                <a:spcPts val="0"/>
-              </a:spcAft>
-              <a:buSzPts val="1300"/>
-              <a:buChar char="●"/>
-            </a:pPr>
-            <a:r>
-              <a:rPr lang="en"/>
-              <a:t>The map is broken down into  evenly sized segments with key points between them being identified.</a:t>
-            </a:r>
-            <a:endParaRPr/>
-          </a:p>
-          <a:p>
-            <a:pPr marL="457200" lvl="0" indent="-311150" algn="l" rtl="0">
-              <a:spcBef>
-                <a:spcPts val="0"/>
-              </a:spcBef>
-              <a:spcAft>
-                <a:spcPts val="0"/>
-              </a:spcAft>
-              <a:buSzPts val="1300"/>
-              <a:buChar char="●"/>
-            </a:pPr>
-            <a:r>
-              <a:rPr lang="en"/>
-              <a:t>A when a start point and end point is selected a path is created using the key points.</a:t>
-            </a:r>
-            <a:endParaRPr/>
-          </a:p>
-          <a:p>
-            <a:pPr marL="457200" lvl="0" indent="-311150" algn="l" rtl="0">
-              <a:spcBef>
-                <a:spcPts val="0"/>
-              </a:spcBef>
-              <a:spcAft>
-                <a:spcPts val="0"/>
-              </a:spcAft>
-              <a:buSzPts val="1300"/>
-              <a:buChar char="●"/>
-            </a:pPr>
-            <a:r>
-              <a:rPr lang="en"/>
-              <a:t>After the path is created it is applied to proper map and refined to fit into it.</a:t>
-            </a:r>
-            <a:endParaRPr/>
-          </a:p>
-        </p:txBody>
-      </p:sp>
-    </p:spTree>
-  </p:cSld>
-  <p:clrMapOvr>
-    <a:masterClrMapping/>
-  </p:clrMapOvr>
-</p:sld>
-</file>
-
-<file path=ppt/slides/slide7.xml><?xml version="1.0" encoding="utf-8"?>
-<p:sld xmlns:a="http://schemas.openxmlformats.org/drawingml/2006/main" xmlns:r="http://schemas.openxmlformats.org/officeDocument/2006/relationships" xmlns:p="http://schemas.openxmlformats.org/presentationml/2006/main">
-  <p:cSld>
-    <p:spTree>
-      <p:nvGrpSpPr>
         <p:cNvPr id="1" name="Shape 121"/>
         <p:cNvGrpSpPr/>
         <p:nvPr/>
@@ -9648,7 +9236,7 @@
 </p:sld>
 </file>
 
-<file path=ppt/slides/slide8.xml><?xml version="1.0" encoding="utf-8"?>
+<file path=ppt/slides/slide7.xml><?xml version="1.0" encoding="utf-8"?>
 <p:sld xmlns:a="http://schemas.openxmlformats.org/drawingml/2006/main" xmlns:r="http://schemas.openxmlformats.org/officeDocument/2006/relationships" xmlns:p="http://schemas.openxmlformats.org/presentationml/2006/main">
   <p:cSld>
     <p:spTree>
@@ -9725,7 +9313,7 @@
 </p:sld>
 </file>
 
-<file path=ppt/slides/slide9.xml><?xml version="1.0" encoding="utf-8"?>
+<file path=ppt/slides/slide8.xml><?xml version="1.0" encoding="utf-8"?>
 <p:sld xmlns:a="http://schemas.openxmlformats.org/drawingml/2006/main" xmlns:r="http://schemas.openxmlformats.org/officeDocument/2006/relationships" xmlns:p="http://schemas.openxmlformats.org/presentationml/2006/main">
   <p:cSld>
     <p:spTree>
@@ -9854,8 +9442,8 @@
               <a:buChar char="●"/>
             </a:pPr>
             <a:r>
-              <a:rPr lang="en" dirty="0"/>
-              <a:t>Was </a:t>
+              <a:rPr lang="en" dirty="0" smtClean="0"/>
+              <a:t>I was </a:t>
             </a:r>
             <a:r>
               <a:rPr lang="en" dirty="0" smtClean="0"/>
@@ -9863,7 +9451,11 @@
             </a:r>
             <a:r>
               <a:rPr lang="en" dirty="0"/>
-              <a:t>to add in dynamic elements to the algorithm.</a:t>
+              <a:t>to add in dynamic elements to the </a:t>
+            </a:r>
+            <a:r>
+              <a:rPr lang="en" dirty="0" smtClean="0"/>
+              <a:t>algorithm which were inspired by the LPA* algorithms method which includes the storing of the previous path and starting at the affected location.</a:t>
             </a:r>
             <a:endParaRPr/>
           </a:p>
@@ -9884,8 +9476,190 @@
             </a:r>
             <a:r>
               <a:rPr lang="en" dirty="0" smtClean="0"/>
-              <a:t>implemented.</a:t>
+              <a:t>implemented</a:t>
             </a:r>
+            <a:r>
+              <a:rPr lang="en" dirty="0" smtClean="0"/>
+              <a:t> </a:t>
+            </a:r>
+            <a:r>
+              <a:rPr lang="en" dirty="0" smtClean="0"/>
+              <a:t>and showed that the created algorithm was generally slower with the time increasing greatly as the distance of the path increased.</a:t>
+            </a:r>
+            <a:endParaRPr/>
+          </a:p>
+        </p:txBody>
+      </p:sp>
+    </p:spTree>
+  </p:cSld>
+  <p:clrMapOvr>
+    <a:masterClrMapping/>
+  </p:clrMapOvr>
+</p:sld>
+</file>
+
+<file path=ppt/slides/slide9.xml><?xml version="1.0" encoding="utf-8"?>
+<p:sld xmlns:a="http://schemas.openxmlformats.org/drawingml/2006/main" xmlns:r="http://schemas.openxmlformats.org/officeDocument/2006/relationships" xmlns:p="http://schemas.openxmlformats.org/presentationml/2006/main">
+  <p:cSld>
+    <p:spTree>
+      <p:nvGrpSpPr>
+        <p:cNvPr id="1" name="Shape 133"/>
+        <p:cNvGrpSpPr/>
+        <p:nvPr/>
+      </p:nvGrpSpPr>
+      <p:grpSpPr>
+        <a:xfrm>
+          <a:off x="0" y="0"/>
+          <a:ext cx="0" cy="0"/>
+          <a:chOff x="0" y="0"/>
+          <a:chExt cx="0" cy="0"/>
+        </a:xfrm>
+      </p:grpSpPr>
+      <p:sp>
+        <p:nvSpPr>
+          <p:cNvPr id="134" name="Google Shape;134;p21"/>
+          <p:cNvSpPr txBox="1">
+            <a:spLocks noGrp="1"/>
+          </p:cNvSpPr>
+          <p:nvPr>
+            <p:ph type="title"/>
+          </p:nvPr>
+        </p:nvSpPr>
+        <p:spPr>
+          <a:xfrm>
+            <a:off x="729450" y="1318650"/>
+            <a:ext cx="7688700" cy="535200"/>
+          </a:xfrm>
+          <a:prstGeom prst="rect">
+            <a:avLst/>
+          </a:prstGeom>
+        </p:spPr>
+        <p:txBody>
+          <a:bodyPr spcFirstLastPara="1" wrap="square" lIns="91425" tIns="91425" rIns="91425" bIns="91425" anchor="t" anchorCtr="0">
+            <a:noAutofit/>
+          </a:bodyPr>
+          <a:lstStyle/>
+          <a:p>
+            <a:pPr marL="0" lvl="0" indent="0" algn="l" rtl="0">
+              <a:spcBef>
+                <a:spcPts val="0"/>
+              </a:spcBef>
+              <a:spcAft>
+                <a:spcPts val="0"/>
+              </a:spcAft>
+              <a:buNone/>
+            </a:pPr>
+            <a:r>
+              <a:rPr lang="en"/>
+              <a:t>Conclusion</a:t>
+            </a:r>
+            <a:endParaRPr/>
+          </a:p>
+        </p:txBody>
+      </p:sp>
+      <p:sp>
+        <p:nvSpPr>
+          <p:cNvPr id="135" name="Google Shape;135;p21"/>
+          <p:cNvSpPr txBox="1">
+            <a:spLocks noGrp="1"/>
+          </p:cNvSpPr>
+          <p:nvPr>
+            <p:ph type="body" idx="1"/>
+          </p:nvPr>
+        </p:nvSpPr>
+        <p:spPr>
+          <a:xfrm>
+            <a:off x="729450" y="2078875"/>
+            <a:ext cx="7688700" cy="2261100"/>
+          </a:xfrm>
+          <a:prstGeom prst="rect">
+            <a:avLst/>
+          </a:prstGeom>
+        </p:spPr>
+        <p:txBody>
+          <a:bodyPr spcFirstLastPara="1" wrap="square" lIns="91425" tIns="91425" rIns="91425" bIns="91425" anchor="t" anchorCtr="0">
+            <a:noAutofit/>
+          </a:bodyPr>
+          <a:lstStyle/>
+          <a:p>
+            <a:pPr marL="457200" lvl="0" indent="-311150" algn="l" rtl="0">
+              <a:spcBef>
+                <a:spcPts val="0"/>
+              </a:spcBef>
+              <a:spcAft>
+                <a:spcPts val="0"/>
+              </a:spcAft>
+              <a:buSzPts val="1300"/>
+              <a:buChar char="●"/>
+            </a:pPr>
+            <a:r>
+              <a:rPr lang="en-GB" dirty="0" smtClean="0"/>
+              <a:t>Most of intended functionality for algorithm achieved.</a:t>
+            </a:r>
+          </a:p>
+          <a:p>
+            <a:pPr marL="457200" lvl="0" indent="-311150" algn="l" rtl="0">
+              <a:spcBef>
+                <a:spcPts val="0"/>
+              </a:spcBef>
+              <a:spcAft>
+                <a:spcPts val="0"/>
+              </a:spcAft>
+              <a:buSzPts val="1300"/>
+              <a:buChar char="●"/>
+            </a:pPr>
+            <a:r>
+              <a:rPr lang="en-GB" dirty="0" smtClean="0"/>
+              <a:t>Algorithm can create viable paths but usually at a much slower rate then the base A* though the paths created by the A* algorithm are not guaranteed to be viable.</a:t>
+            </a:r>
+          </a:p>
+          <a:p>
+            <a:pPr marL="457200" lvl="0" indent="-311150" algn="l" rtl="0">
+              <a:spcBef>
+                <a:spcPts val="0"/>
+              </a:spcBef>
+              <a:spcAft>
+                <a:spcPts val="0"/>
+              </a:spcAft>
+              <a:buSzPts val="1300"/>
+              <a:buChar char="●"/>
+            </a:pPr>
+            <a:r>
+              <a:rPr lang="en-GB" dirty="0" smtClean="0"/>
+              <a:t>Dynamic elements were integrated.</a:t>
+            </a:r>
+          </a:p>
+          <a:p>
+            <a:pPr marL="457200" lvl="0" indent="-311150" algn="l" rtl="0">
+              <a:spcBef>
+                <a:spcPts val="0"/>
+              </a:spcBef>
+              <a:spcAft>
+                <a:spcPts val="0"/>
+              </a:spcAft>
+              <a:buSzPts val="1300"/>
+              <a:buChar char="●"/>
+            </a:pPr>
+            <a:r>
+              <a:rPr lang="en-GB" dirty="0" smtClean="0"/>
+              <a:t>There are still multiple ways in which the efficiency of the algorithm could be increased such as determining if a path is viable earlier</a:t>
+            </a:r>
+            <a:r>
+              <a:rPr lang="en-GB" dirty="0" smtClean="0"/>
+              <a:t>.</a:t>
+            </a:r>
+          </a:p>
+          <a:p>
+            <a:pPr marL="457200" lvl="0" indent="-311150" algn="l" rtl="0">
+              <a:spcBef>
+                <a:spcPts val="0"/>
+              </a:spcBef>
+              <a:spcAft>
+                <a:spcPts val="0"/>
+              </a:spcAft>
+              <a:buSzPts val="1300"/>
+              <a:buChar char="●"/>
+            </a:pPr>
             <a:endParaRPr/>
           </a:p>
         </p:txBody>

</xml_diff>